<commit_message>
Added Data Source slide
</commit_message>
<xml_diff>
--- a/Presentation_ProjectOne.pptx
+++ b/Presentation_ProjectOne.pptx
@@ -5,25 +5,26 @@
     <p:sldMasterId id="2147483648" r:id="rId1"/>
   </p:sldMasterIdLst>
   <p:notesMasterIdLst>
-    <p:notesMasterId r:id="rId15"/>
+    <p:notesMasterId r:id="rId16"/>
   </p:notesMasterIdLst>
   <p:handoutMasterIdLst>
-    <p:handoutMasterId r:id="rId16"/>
+    <p:handoutMasterId r:id="rId17"/>
   </p:handoutMasterIdLst>
   <p:sldIdLst>
     <p:sldId id="265" r:id="rId2"/>
     <p:sldId id="274" r:id="rId3"/>
     <p:sldId id="298" r:id="rId4"/>
-    <p:sldId id="297" r:id="rId5"/>
-    <p:sldId id="305" r:id="rId6"/>
-    <p:sldId id="311" r:id="rId7"/>
-    <p:sldId id="307" r:id="rId8"/>
-    <p:sldId id="306" r:id="rId9"/>
-    <p:sldId id="309" r:id="rId10"/>
-    <p:sldId id="300" r:id="rId11"/>
-    <p:sldId id="301" r:id="rId12"/>
-    <p:sldId id="303" r:id="rId13"/>
-    <p:sldId id="304" r:id="rId14"/>
+    <p:sldId id="312" r:id="rId5"/>
+    <p:sldId id="297" r:id="rId6"/>
+    <p:sldId id="305" r:id="rId7"/>
+    <p:sldId id="311" r:id="rId8"/>
+    <p:sldId id="307" r:id="rId9"/>
+    <p:sldId id="306" r:id="rId10"/>
+    <p:sldId id="309" r:id="rId11"/>
+    <p:sldId id="300" r:id="rId12"/>
+    <p:sldId id="301" r:id="rId13"/>
+    <p:sldId id="303" r:id="rId14"/>
+    <p:sldId id="304" r:id="rId15"/>
   </p:sldIdLst>
   <p:sldSz cx="12192000" cy="6858000"/>
   <p:notesSz cx="6858000" cy="9144000"/>
@@ -242,7 +243,7 @@
           <a:p>
             <a:fld id="{20EA5F0D-C1DC-412F-A146-DDB3A74B588F}" type="datetimeFigureOut">
               <a:rPr lang="en-US"/>
-              <a:t>12/23/20</a:t>
+              <a:t>12/23/2020</a:t>
             </a:fld>
             <a:endParaRPr/>
           </a:p>
@@ -407,7 +408,7 @@
           <a:p>
             <a:fld id="{A8CDE508-72C8-4AB5-AA9C-1584D31690E0}" type="datetimeFigureOut">
               <a:rPr lang="en-US"/>
-              <a:t>12/23/20</a:t>
+              <a:t>12/23/2020</a:t>
             </a:fld>
             <a:endParaRPr/>
           </a:p>
@@ -811,7 +812,7 @@
                 <a:latin typeface="Arial" panose="020B0604020202020204" pitchFamily="34" charset="0"/>
                 <a:cs typeface="Arial" panose="020B0604020202020204" pitchFamily="34" charset="0"/>
               </a:rPr>
-              <a:t>Discuss any difficulties that arose, and how you dealt with them</a:t>
+              <a:t>Discuss the steps you took to analyze the data and answer each question you asked in your proposal</a:t>
             </a:r>
           </a:p>
           <a:p>
@@ -824,19 +825,28 @@
                 <a:latin typeface="Arial" panose="020B0604020202020204" pitchFamily="34" charset="0"/>
                 <a:cs typeface="Arial" panose="020B0604020202020204" pitchFamily="34" charset="0"/>
               </a:rPr>
-              <a:t>  * Discuss any additional questions that came up, but which you didn't have time to answer: What would you research next, if you had two more weeks?</a:t>
-            </a:r>
-          </a:p>
-          <a:p>
-            <a:pPr rtl="0"/>
-            <a:endParaRPr lang="en-US" sz="1200" b="0" i="1" u="none" strike="noStrike" kern="1200" baseline="0" dirty="0">
-              <a:solidFill>
-                <a:schemeClr val="tx1"/>
-              </a:solidFill>
-              <a:latin typeface="+mn-lt"/>
-              <a:ea typeface="+mn-ea"/>
-              <a:cs typeface="+mn-cs"/>
-            </a:endParaRPr>
+              <a:t>  * Present and discuss interesting figures developed during analysis, ideally with the help of </a:t>
+            </a:r>
+            <a:r>
+              <a:rPr lang="en-US" sz="1200" i="1" dirty="0" err="1">
+                <a:solidFill>
+                  <a:schemeClr val="accent1"/>
+                </a:solidFill>
+                <a:latin typeface="Arial" panose="020B0604020202020204" pitchFamily="34" charset="0"/>
+                <a:cs typeface="Arial" panose="020B0604020202020204" pitchFamily="34" charset="0"/>
+              </a:rPr>
+              <a:t>Jupyter</a:t>
+            </a:r>
+            <a:r>
+              <a:rPr lang="en-US" sz="1200" i="1" dirty="0">
+                <a:solidFill>
+                  <a:schemeClr val="accent1"/>
+                </a:solidFill>
+                <a:latin typeface="Arial" panose="020B0604020202020204" pitchFamily="34" charset="0"/>
+                <a:cs typeface="Arial" panose="020B0604020202020204" pitchFamily="34" charset="0"/>
+              </a:rPr>
+              <a:t> Notebook</a:t>
+            </a:r>
           </a:p>
         </p:txBody>
       </p:sp>
@@ -866,7 +876,7 @@
     </p:spTree>
     <p:extLst>
       <p:ext uri="{BB962C8B-B14F-4D97-AF65-F5344CB8AC3E}">
-        <p14:creationId xmlns:p14="http://schemas.microsoft.com/office/powerpoint/2010/main" val="2175065658"/>
+        <p14:creationId xmlns:p14="http://schemas.microsoft.com/office/powerpoint/2010/main" val="3477948480"/>
       </p:ext>
     </p:extLst>
   </p:cSld>
@@ -920,6 +930,32 @@
           <a:bodyPr/>
           <a:lstStyle/>
           <a:p>
+            <a:pPr marL="45720"/>
+            <a:r>
+              <a:rPr lang="en-US" sz="1200" i="1" dirty="0">
+                <a:solidFill>
+                  <a:schemeClr val="accent1"/>
+                </a:solidFill>
+                <a:latin typeface="Arial" panose="020B0604020202020204" pitchFamily="34" charset="0"/>
+                <a:cs typeface="Arial" panose="020B0604020202020204" pitchFamily="34" charset="0"/>
+              </a:rPr>
+              <a:t>Discuss any difficulties that arose, and how you dealt with them</a:t>
+            </a:r>
+          </a:p>
+          <a:p>
+            <a:pPr marL="45720"/>
+            <a:r>
+              <a:rPr lang="en-US" sz="1200" i="1" dirty="0">
+                <a:solidFill>
+                  <a:schemeClr val="accent1"/>
+                </a:solidFill>
+                <a:latin typeface="Arial" panose="020B0604020202020204" pitchFamily="34" charset="0"/>
+                <a:cs typeface="Arial" panose="020B0604020202020204" pitchFamily="34" charset="0"/>
+              </a:rPr>
+              <a:t>  * Discuss any additional questions that came up, but which you didn't have time to answer: What would you research next, if you had two more weeks?</a:t>
+            </a:r>
+          </a:p>
+          <a:p>
             <a:pPr rtl="0"/>
             <a:endParaRPr lang="en-US" sz="1200" b="0" i="1" u="none" strike="noStrike" kern="1200" baseline="0" dirty="0">
               <a:solidFill>
@@ -950,6 +986,98 @@
             <a:fld id="{7FB667E1-E601-4AAF-B95C-B25720D70A60}" type="slidenum">
               <a:rPr lang="en-US" smtClean="0"/>
               <a:t>13</a:t>
+            </a:fld>
+            <a:endParaRPr lang="en-US"/>
+          </a:p>
+        </p:txBody>
+      </p:sp>
+    </p:spTree>
+    <p:extLst>
+      <p:ext uri="{BB962C8B-B14F-4D97-AF65-F5344CB8AC3E}">
+        <p14:creationId xmlns:p14="http://schemas.microsoft.com/office/powerpoint/2010/main" val="2175065658"/>
+      </p:ext>
+    </p:extLst>
+  </p:cSld>
+  <p:clrMapOvr>
+    <a:masterClrMapping/>
+  </p:clrMapOvr>
+</p:notes>
+</file>
+
+<file path=ppt/notesSlides/notesSlide12.xml><?xml version="1.0" encoding="utf-8"?>
+<p:notes xmlns:a="http://schemas.openxmlformats.org/drawingml/2006/main" xmlns:r="http://schemas.openxmlformats.org/officeDocument/2006/relationships" xmlns:p="http://schemas.openxmlformats.org/presentationml/2006/main">
+  <p:cSld>
+    <p:spTree>
+      <p:nvGrpSpPr>
+        <p:cNvPr id="1" name=""/>
+        <p:cNvGrpSpPr/>
+        <p:nvPr/>
+      </p:nvGrpSpPr>
+      <p:grpSpPr>
+        <a:xfrm>
+          <a:off x="0" y="0"/>
+          <a:ext cx="0" cy="0"/>
+          <a:chOff x="0" y="0"/>
+          <a:chExt cx="0" cy="0"/>
+        </a:xfrm>
+      </p:grpSpPr>
+      <p:sp>
+        <p:nvSpPr>
+          <p:cNvPr id="2" name="Slide Image Placeholder 1"/>
+          <p:cNvSpPr>
+            <a:spLocks noGrp="1" noRot="1" noChangeAspect="1"/>
+          </p:cNvSpPr>
+          <p:nvPr>
+            <p:ph type="sldImg"/>
+          </p:nvPr>
+        </p:nvSpPr>
+        <p:spPr/>
+      </p:sp>
+      <p:sp>
+        <p:nvSpPr>
+          <p:cNvPr id="3" name="Notes Placeholder 2"/>
+          <p:cNvSpPr>
+            <a:spLocks noGrp="1"/>
+          </p:cNvSpPr>
+          <p:nvPr>
+            <p:ph type="body" idx="1"/>
+          </p:nvPr>
+        </p:nvSpPr>
+        <p:spPr/>
+        <p:txBody>
+          <a:bodyPr/>
+          <a:lstStyle/>
+          <a:p>
+            <a:pPr rtl="0"/>
+            <a:endParaRPr lang="en-US" sz="1200" b="0" i="1" u="none" strike="noStrike" kern="1200" baseline="0" dirty="0">
+              <a:solidFill>
+                <a:schemeClr val="tx1"/>
+              </a:solidFill>
+              <a:latin typeface="+mn-lt"/>
+              <a:ea typeface="+mn-ea"/>
+              <a:cs typeface="+mn-cs"/>
+            </a:endParaRPr>
+          </a:p>
+        </p:txBody>
+      </p:sp>
+      <p:sp>
+        <p:nvSpPr>
+          <p:cNvPr id="4" name="Slide Number Placeholder 3"/>
+          <p:cNvSpPr>
+            <a:spLocks noGrp="1"/>
+          </p:cNvSpPr>
+          <p:nvPr>
+            <p:ph type="sldNum" sz="quarter" idx="10"/>
+          </p:nvPr>
+        </p:nvSpPr>
+        <p:spPr/>
+        <p:txBody>
+          <a:bodyPr/>
+          <a:lstStyle/>
+          <a:p>
+            <a:fld id="{7FB667E1-E601-4AAF-B95C-B25720D70A60}" type="slidenum">
+              <a:rPr lang="en-US" smtClean="0"/>
+              <a:t>14</a:t>
             </a:fld>
             <a:endParaRPr lang="en-US"/>
           </a:p>
@@ -1246,30 +1374,65 @@
           <a:bodyPr/>
           <a:lstStyle/>
           <a:p>
-            <a:pPr marL="45720"/>
-            <a:r>
-              <a:rPr lang="en-US" sz="1200" i="1" dirty="0">
+            <a:pPr rtl="0"/>
+            <a:r>
+              <a:rPr lang="en-US" sz="1200" b="0" i="1" u="none" strike="noStrike" kern="1200" baseline="0" dirty="0">
                 <a:solidFill>
-                  <a:schemeClr val="accent1"/>
+                  <a:schemeClr val="tx1"/>
                 </a:solidFill>
-                <a:latin typeface="Arial" panose="020B0604020202020204" pitchFamily="34" charset="0"/>
-                <a:cs typeface="Arial" panose="020B0604020202020204" pitchFamily="34" charset="0"/>
+                <a:latin typeface="+mn-lt"/>
+                <a:ea typeface="+mn-ea"/>
+                <a:cs typeface="+mn-cs"/>
               </a:rPr>
-              <a:t>Define the core message or hypothesis of your project.</a:t>
-            </a:r>
-          </a:p>
-          <a:p>
-            <a:pPr marL="45720"/>
-            <a:r>
-              <a:rPr lang="en-US" sz="1200" i="1" dirty="0">
+              <a:t>Missy</a:t>
+            </a:r>
+          </a:p>
+          <a:p>
+            <a:pPr rtl="0"/>
+            <a:r>
+              <a:rPr lang="en-US" sz="1200" b="0" i="1" u="none" strike="noStrike" kern="1200" baseline="0" dirty="0">
                 <a:solidFill>
-                  <a:schemeClr val="accent1"/>
+                  <a:schemeClr val="tx1"/>
                 </a:solidFill>
-                <a:latin typeface="Arial" panose="020B0604020202020204" pitchFamily="34" charset="0"/>
-                <a:cs typeface="Arial" panose="020B0604020202020204" pitchFamily="34" charset="0"/>
+                <a:latin typeface="+mn-lt"/>
+                <a:ea typeface="+mn-ea"/>
+                <a:cs typeface="+mn-cs"/>
               </a:rPr>
-              <a:t>Describe the questions you asked, and _why_ you asked them</a:t>
-            </a:r>
+              <a:t>Split into two (2)</a:t>
+            </a:r>
+          </a:p>
+          <a:p>
+            <a:pPr rtl="0"/>
+            <a:r>
+              <a:rPr lang="en-US" i="1" dirty="0"/>
+              <a:t>Throw in google map showing focus parks</a:t>
+            </a:r>
+          </a:p>
+          <a:p>
+            <a:pPr rtl="0"/>
+            <a:endParaRPr lang="en-US" sz="1200" b="0" i="1" u="none" strike="noStrike" kern="1200" baseline="0" dirty="0">
+              <a:solidFill>
+                <a:schemeClr val="tx1"/>
+              </a:solidFill>
+              <a:latin typeface="+mn-lt"/>
+              <a:ea typeface="+mn-ea"/>
+              <a:cs typeface="+mn-cs"/>
+            </a:endParaRPr>
+          </a:p>
+          <a:p>
+            <a:pPr rtl="0"/>
+            <a:r>
+              <a:rPr lang="en-US" i="1" dirty="0"/>
+              <a:t>1 vis</a:t>
+            </a:r>
+            <a:endParaRPr lang="en-US" sz="1200" b="0" i="1" u="none" strike="noStrike" kern="1200" baseline="0" dirty="0">
+              <a:solidFill>
+                <a:schemeClr val="tx1"/>
+              </a:solidFill>
+              <a:latin typeface="+mn-lt"/>
+              <a:ea typeface="+mn-ea"/>
+              <a:cs typeface="+mn-cs"/>
+            </a:endParaRPr>
           </a:p>
         </p:txBody>
       </p:sp>
@@ -1299,7 +1462,7 @@
     </p:spTree>
     <p:extLst>
       <p:ext uri="{BB962C8B-B14F-4D97-AF65-F5344CB8AC3E}">
-        <p14:creationId xmlns:p14="http://schemas.microsoft.com/office/powerpoint/2010/main" val="2580414193"/>
+        <p14:creationId xmlns:p14="http://schemas.microsoft.com/office/powerpoint/2010/main" val="3840453484"/>
       </p:ext>
     </p:extLst>
   </p:cSld>
@@ -1354,16 +1517,6 @@
           <a:lstStyle/>
           <a:p>
             <a:pPr marL="45720"/>
-            <a:endParaRPr lang="en-US" sz="1200" i="1" dirty="0">
-              <a:solidFill>
-                <a:schemeClr val="accent1"/>
-              </a:solidFill>
-              <a:latin typeface="Arial" panose="020B0604020202020204" pitchFamily="34" charset="0"/>
-              <a:cs typeface="Arial" panose="020B0604020202020204" pitchFamily="34" charset="0"/>
-            </a:endParaRPr>
-          </a:p>
-          <a:p>
-            <a:pPr marL="45720"/>
             <a:r>
               <a:rPr lang="en-US" sz="1200" i="1" dirty="0">
                 <a:solidFill>
@@ -1372,30 +1525,11 @@
                 <a:latin typeface="Arial" panose="020B0604020202020204" pitchFamily="34" charset="0"/>
                 <a:cs typeface="Arial" panose="020B0604020202020204" pitchFamily="34" charset="0"/>
               </a:rPr>
-              <a:t>Describe whether you were able to answer these questions to your satisfaction, and briefly summarize your findings</a:t>
-            </a:r>
-          </a:p>
-          <a:p>
-            <a:endParaRPr lang="en-US" dirty="0"/>
-          </a:p>
-          <a:p>
-            <a:pPr marL="0" marR="0" lvl="0" indent="0" algn="l" defTabSz="914400" rtl="0" eaLnBrk="1" fontAlgn="auto" latinLnBrk="0" hangingPunct="1">
-              <a:lnSpc>
-                <a:spcPct val="100000"/>
-              </a:lnSpc>
-              <a:spcBef>
-                <a:spcPts val="0"/>
-              </a:spcBef>
-              <a:spcAft>
-                <a:spcPts val="0"/>
-              </a:spcAft>
-              <a:buClrTx/>
-              <a:buSzTx/>
-              <a:buFontTx/>
-              <a:buNone/>
-              <a:tabLst/>
-              <a:defRPr/>
-            </a:pPr>
+              <a:t>Define the core message or hypothesis of your project.</a:t>
+            </a:r>
+          </a:p>
+          <a:p>
+            <a:pPr marL="45720"/>
             <a:r>
               <a:rPr lang="en-US" sz="1200" i="1" dirty="0">
                 <a:solidFill>
@@ -1404,11 +1538,8 @@
                 <a:latin typeface="Arial" panose="020B0604020202020204" pitchFamily="34" charset="0"/>
                 <a:cs typeface="Arial" panose="020B0604020202020204" pitchFamily="34" charset="0"/>
               </a:rPr>
-              <a:t>Elaborate on the questions you asked, describing what kinds of data you needed to answer them, and where you found it</a:t>
-            </a:r>
-          </a:p>
-          <a:p>
-            <a:endParaRPr lang="en-US" dirty="0"/>
+              <a:t>Describe the questions you asked, and _why_ you asked them</a:t>
+            </a:r>
           </a:p>
         </p:txBody>
       </p:sp>
@@ -1419,7 +1550,7 @@
             <a:spLocks noGrp="1"/>
           </p:cNvSpPr>
           <p:nvPr>
-            <p:ph type="sldNum" sz="quarter" idx="5"/>
+            <p:ph type="sldNum" sz="quarter" idx="10"/>
           </p:nvPr>
         </p:nvSpPr>
         <p:spPr/>
@@ -1438,7 +1569,7 @@
     </p:spTree>
     <p:extLst>
       <p:ext uri="{BB962C8B-B14F-4D97-AF65-F5344CB8AC3E}">
-        <p14:creationId xmlns:p14="http://schemas.microsoft.com/office/powerpoint/2010/main" val="2515451232"/>
+        <p14:creationId xmlns:p14="http://schemas.microsoft.com/office/powerpoint/2010/main" val="2580414193"/>
       </p:ext>
     </p:extLst>
   </p:cSld>
@@ -1492,6 +1623,61 @@
           <a:bodyPr/>
           <a:lstStyle/>
           <a:p>
+            <a:pPr marL="45720"/>
+            <a:endParaRPr lang="en-US" sz="1200" i="1" dirty="0">
+              <a:solidFill>
+                <a:schemeClr val="accent1"/>
+              </a:solidFill>
+              <a:latin typeface="Arial" panose="020B0604020202020204" pitchFamily="34" charset="0"/>
+              <a:cs typeface="Arial" panose="020B0604020202020204" pitchFamily="34" charset="0"/>
+            </a:endParaRPr>
+          </a:p>
+          <a:p>
+            <a:pPr marL="45720"/>
+            <a:r>
+              <a:rPr lang="en-US" sz="1200" i="1" dirty="0">
+                <a:solidFill>
+                  <a:schemeClr val="accent1"/>
+                </a:solidFill>
+                <a:latin typeface="Arial" panose="020B0604020202020204" pitchFamily="34" charset="0"/>
+                <a:cs typeface="Arial" panose="020B0604020202020204" pitchFamily="34" charset="0"/>
+              </a:rPr>
+              <a:t>Describe whether you were able to answer these questions to your satisfaction, and briefly summarize your findings</a:t>
+            </a:r>
+          </a:p>
+          <a:p>
+            <a:endParaRPr lang="en-US" dirty="0"/>
+          </a:p>
+          <a:p>
+            <a:pPr marL="0" marR="0" lvl="0" indent="0" algn="l" defTabSz="914400" rtl="0" eaLnBrk="1" fontAlgn="auto" latinLnBrk="0" hangingPunct="1">
+              <a:lnSpc>
+                <a:spcPct val="100000"/>
+              </a:lnSpc>
+              <a:spcBef>
+                <a:spcPts val="0"/>
+              </a:spcBef>
+              <a:spcAft>
+                <a:spcPts val="0"/>
+              </a:spcAft>
+              <a:buClrTx/>
+              <a:buSzTx/>
+              <a:buFontTx/>
+              <a:buNone/>
+              <a:tabLst/>
+              <a:defRPr/>
+            </a:pPr>
+            <a:r>
+              <a:rPr lang="en-US" sz="1200" i="1" dirty="0">
+                <a:solidFill>
+                  <a:schemeClr val="accent1"/>
+                </a:solidFill>
+                <a:latin typeface="Arial" panose="020B0604020202020204" pitchFamily="34" charset="0"/>
+                <a:cs typeface="Arial" panose="020B0604020202020204" pitchFamily="34" charset="0"/>
+              </a:rPr>
+              <a:t>Elaborate on the questions you asked, describing what kinds of data you needed to answer them, and where you found it</a:t>
+            </a:r>
+          </a:p>
+          <a:p>
             <a:endParaRPr lang="en-US" dirty="0"/>
           </a:p>
         </p:txBody>
@@ -1513,7 +1699,7 @@
           <a:p>
             <a:fld id="{7FB667E1-E601-4AAF-B95C-B25720D70A60}" type="slidenum">
               <a:rPr lang="en-US" smtClean="0"/>
-              <a:t>7</a:t>
+              <a:t>6</a:t>
             </a:fld>
             <a:endParaRPr lang="en-US"/>
           </a:p>
@@ -1522,7 +1708,7 @@
     </p:spTree>
     <p:extLst>
       <p:ext uri="{BB962C8B-B14F-4D97-AF65-F5344CB8AC3E}">
-        <p14:creationId xmlns:p14="http://schemas.microsoft.com/office/powerpoint/2010/main" val="982614931"/>
+        <p14:creationId xmlns:p14="http://schemas.microsoft.com/office/powerpoint/2010/main" val="2515451232"/>
       </p:ext>
     </p:extLst>
   </p:cSld>
@@ -1576,22 +1762,7 @@
           <a:bodyPr/>
           <a:lstStyle/>
           <a:p>
-            <a:r>
-              <a:rPr lang="en-US" dirty="0" err="1"/>
-              <a:t>Covid</a:t>
-            </a:r>
-            <a:r>
-              <a:rPr lang="en-US" dirty="0"/>
-              <a:t> – </a:t>
-            </a:r>
-            <a:r>
-              <a:rPr lang="en-US" dirty="0" err="1"/>
-              <a:t>specifc</a:t>
-            </a:r>
-            <a:r>
-              <a:rPr lang="en-US" dirty="0"/>
-              <a:t> (so answers Q1)</a:t>
-            </a:r>
+            <a:endParaRPr lang="en-US" dirty="0"/>
           </a:p>
         </p:txBody>
       </p:sp>
@@ -1621,7 +1792,7 @@
     </p:spTree>
     <p:extLst>
       <p:ext uri="{BB962C8B-B14F-4D97-AF65-F5344CB8AC3E}">
-        <p14:creationId xmlns:p14="http://schemas.microsoft.com/office/powerpoint/2010/main" val="322601199"/>
+        <p14:creationId xmlns:p14="http://schemas.microsoft.com/office/powerpoint/2010/main" val="982614931"/>
       </p:ext>
     </p:extLst>
   </p:cSld>
@@ -1675,87 +1846,22 @@
           <a:bodyPr/>
           <a:lstStyle/>
           <a:p>
-            <a:pPr marL="45720"/>
-            <a:r>
-              <a:rPr lang="en-US" sz="1200" i="1" dirty="0">
-                <a:solidFill>
-                  <a:schemeClr val="accent1"/>
-                </a:solidFill>
-                <a:latin typeface="Arial" panose="020B0604020202020204" pitchFamily="34" charset="0"/>
-                <a:cs typeface="Arial" panose="020B0604020202020204" pitchFamily="34" charset="0"/>
-              </a:rPr>
-              <a:t>Describe the exploration and cleanup process</a:t>
-            </a:r>
-          </a:p>
-          <a:p>
-            <a:pPr marL="45720"/>
-            <a:r>
-              <a:rPr lang="en-US" sz="1200" i="1" dirty="0">
-                <a:solidFill>
-                  <a:schemeClr val="accent1"/>
-                </a:solidFill>
-                <a:latin typeface="Arial" panose="020B0604020202020204" pitchFamily="34" charset="0"/>
-                <a:cs typeface="Arial" panose="020B0604020202020204" pitchFamily="34" charset="0"/>
-              </a:rPr>
-              <a:t>  * Discuss insights you had while exploring the data that you didn't anticipate</a:t>
-            </a:r>
-          </a:p>
-          <a:p>
-            <a:pPr marL="45720"/>
-            <a:r>
-              <a:rPr lang="en-US" sz="1200" i="1" dirty="0">
-                <a:solidFill>
-                  <a:schemeClr val="accent1"/>
-                </a:solidFill>
-                <a:latin typeface="Arial" panose="020B0604020202020204" pitchFamily="34" charset="0"/>
-                <a:cs typeface="Arial" panose="020B0604020202020204" pitchFamily="34" charset="0"/>
-              </a:rPr>
-              <a:t>  * Discuss any problems that arose after exploring the data, and how you resolved them</a:t>
-            </a:r>
-          </a:p>
-          <a:p>
-            <a:pPr marL="45720"/>
-            <a:r>
-              <a:rPr lang="en-US" sz="1200" i="1" dirty="0">
-                <a:solidFill>
-                  <a:schemeClr val="accent1"/>
-                </a:solidFill>
-                <a:latin typeface="Arial" panose="020B0604020202020204" pitchFamily="34" charset="0"/>
-                <a:cs typeface="Arial" panose="020B0604020202020204" pitchFamily="34" charset="0"/>
-              </a:rPr>
-              <a:t>  * Present and discuss interesting figures developed during exploration, ideally with the help of </a:t>
-            </a:r>
-            <a:r>
-              <a:rPr lang="en-US" sz="1200" i="1" dirty="0" err="1">
-                <a:solidFill>
-                  <a:schemeClr val="accent1"/>
-                </a:solidFill>
-                <a:latin typeface="Arial" panose="020B0604020202020204" pitchFamily="34" charset="0"/>
-                <a:cs typeface="Arial" panose="020B0604020202020204" pitchFamily="34" charset="0"/>
-              </a:rPr>
-              <a:t>Jupyter</a:t>
-            </a:r>
-            <a:r>
-              <a:rPr lang="en-US" sz="1200" i="1" dirty="0">
-                <a:solidFill>
-                  <a:schemeClr val="accent1"/>
-                </a:solidFill>
-                <a:latin typeface="Arial" panose="020B0604020202020204" pitchFamily="34" charset="0"/>
-                <a:cs typeface="Arial" panose="020B0604020202020204" pitchFamily="34" charset="0"/>
-              </a:rPr>
-              <a:t> Notebook</a:t>
-            </a:r>
-          </a:p>
-          <a:p>
-            <a:pPr rtl="0"/>
-            <a:endParaRPr lang="en-US" sz="1200" b="0" i="1" u="none" strike="noStrike" kern="1200" baseline="0" dirty="0">
-              <a:solidFill>
-                <a:schemeClr val="tx1"/>
-              </a:solidFill>
-              <a:latin typeface="+mn-lt"/>
-              <a:ea typeface="+mn-ea"/>
-              <a:cs typeface="+mn-cs"/>
-            </a:endParaRPr>
+            <a:r>
+              <a:rPr lang="en-US" dirty="0" err="1"/>
+              <a:t>Covid</a:t>
+            </a:r>
+            <a:r>
+              <a:rPr lang="en-US" dirty="0"/>
+              <a:t> – </a:t>
+            </a:r>
+            <a:r>
+              <a:rPr lang="en-US" dirty="0" err="1"/>
+              <a:t>specifc</a:t>
+            </a:r>
+            <a:r>
+              <a:rPr lang="en-US" dirty="0"/>
+              <a:t> (so answers Q1)</a:t>
+            </a:r>
           </a:p>
         </p:txBody>
       </p:sp>
@@ -1766,7 +1872,7 @@
             <a:spLocks noGrp="1"/>
           </p:cNvSpPr>
           <p:nvPr>
-            <p:ph type="sldNum" sz="quarter" idx="10"/>
+            <p:ph type="sldNum" sz="quarter" idx="5"/>
           </p:nvPr>
         </p:nvSpPr>
         <p:spPr/>
@@ -1776,7 +1882,7 @@
           <a:p>
             <a:fld id="{7FB667E1-E601-4AAF-B95C-B25720D70A60}" type="slidenum">
               <a:rPr lang="en-US" smtClean="0"/>
-              <a:t>10</a:t>
+              <a:t>9</a:t>
             </a:fld>
             <a:endParaRPr lang="en-US"/>
           </a:p>
@@ -1785,7 +1891,7 @@
     </p:spTree>
     <p:extLst>
       <p:ext uri="{BB962C8B-B14F-4D97-AF65-F5344CB8AC3E}">
-        <p14:creationId xmlns:p14="http://schemas.microsoft.com/office/powerpoint/2010/main" val="584283159"/>
+        <p14:creationId xmlns:p14="http://schemas.microsoft.com/office/powerpoint/2010/main" val="322601199"/>
       </p:ext>
     </p:extLst>
   </p:cSld>
@@ -1848,7 +1954,7 @@
                 <a:latin typeface="Arial" panose="020B0604020202020204" pitchFamily="34" charset="0"/>
                 <a:cs typeface="Arial" panose="020B0604020202020204" pitchFamily="34" charset="0"/>
               </a:rPr>
-              <a:t>Discuss the steps you took to analyze the data and answer each question you asked in your proposal</a:t>
+              <a:t>Describe the exploration and cleanup process</a:t>
             </a:r>
           </a:p>
           <a:p>
@@ -1861,7 +1967,33 @@
                 <a:latin typeface="Arial" panose="020B0604020202020204" pitchFamily="34" charset="0"/>
                 <a:cs typeface="Arial" panose="020B0604020202020204" pitchFamily="34" charset="0"/>
               </a:rPr>
-              <a:t>  * Present and discuss interesting figures developed during analysis, ideally with the help of </a:t>
+              <a:t>  * Discuss insights you had while exploring the data that you didn't anticipate</a:t>
+            </a:r>
+          </a:p>
+          <a:p>
+            <a:pPr marL="45720"/>
+            <a:r>
+              <a:rPr lang="en-US" sz="1200" i="1" dirty="0">
+                <a:solidFill>
+                  <a:schemeClr val="accent1"/>
+                </a:solidFill>
+                <a:latin typeface="Arial" panose="020B0604020202020204" pitchFamily="34" charset="0"/>
+                <a:cs typeface="Arial" panose="020B0604020202020204" pitchFamily="34" charset="0"/>
+              </a:rPr>
+              <a:t>  * Discuss any problems that arose after exploring the data, and how you resolved them</a:t>
+            </a:r>
+          </a:p>
+          <a:p>
+            <a:pPr marL="45720"/>
+            <a:r>
+              <a:rPr lang="en-US" sz="1200" i="1" dirty="0">
+                <a:solidFill>
+                  <a:schemeClr val="accent1"/>
+                </a:solidFill>
+                <a:latin typeface="Arial" panose="020B0604020202020204" pitchFamily="34" charset="0"/>
+                <a:cs typeface="Arial" panose="020B0604020202020204" pitchFamily="34" charset="0"/>
+              </a:rPr>
+              <a:t>  * Present and discuss interesting figures developed during exploration, ideally with the help of </a:t>
             </a:r>
             <a:r>
               <a:rPr lang="en-US" sz="1200" i="1" dirty="0" err="1">
@@ -1884,6 +2016,17 @@
               <a:t> Notebook</a:t>
             </a:r>
           </a:p>
+          <a:p>
+            <a:pPr rtl="0"/>
+            <a:endParaRPr lang="en-US" sz="1200" b="0" i="1" u="none" strike="noStrike" kern="1200" baseline="0" dirty="0">
+              <a:solidFill>
+                <a:schemeClr val="tx1"/>
+              </a:solidFill>
+              <a:latin typeface="+mn-lt"/>
+              <a:ea typeface="+mn-ea"/>
+              <a:cs typeface="+mn-cs"/>
+            </a:endParaRPr>
+          </a:p>
         </p:txBody>
       </p:sp>
       <p:sp>
@@ -1912,7 +2055,7 @@
     </p:spTree>
     <p:extLst>
       <p:ext uri="{BB962C8B-B14F-4D97-AF65-F5344CB8AC3E}">
-        <p14:creationId xmlns:p14="http://schemas.microsoft.com/office/powerpoint/2010/main" val="3477948480"/>
+        <p14:creationId xmlns:p14="http://schemas.microsoft.com/office/powerpoint/2010/main" val="584283159"/>
       </p:ext>
     </p:extLst>
   </p:cSld>
@@ -2560,7 +2703,7 @@
             <a:fld id="{9E583DDF-CA54-461A-A486-592D2374C532}" type="datetimeFigureOut">
               <a:rPr lang="en-US"/>
               <a:pPr/>
-              <a:t>12/23/20</a:t>
+              <a:t>12/23/2020</a:t>
             </a:fld>
             <a:endParaRPr/>
           </a:p>
@@ -2936,7 +3079,7 @@
           <a:p>
             <a:fld id="{9E583DDF-CA54-461A-A486-592D2374C532}" type="datetimeFigureOut">
               <a:rPr lang="en-US"/>
-              <a:t>12/23/20</a:t>
+              <a:t>12/23/2020</a:t>
             </a:fld>
             <a:endParaRPr/>
           </a:p>
@@ -3118,7 +3261,7 @@
           <a:p>
             <a:fld id="{9E583DDF-CA54-461A-A486-592D2374C532}" type="datetimeFigureOut">
               <a:rPr lang="en-US"/>
-              <a:t>12/23/20</a:t>
+              <a:t>12/23/2020</a:t>
             </a:fld>
             <a:endParaRPr/>
           </a:p>
@@ -3310,7 +3453,7 @@
           <a:p>
             <a:fld id="{9E583DDF-CA54-461A-A486-592D2374C532}" type="datetimeFigureOut">
               <a:rPr lang="en-US"/>
-              <a:t>12/23/20</a:t>
+              <a:t>12/23/2020</a:t>
             </a:fld>
             <a:endParaRPr/>
           </a:p>
@@ -3496,7 +3639,7 @@
           <a:p>
             <a:fld id="{9E583DDF-CA54-461A-A486-592D2374C532}" type="datetimeFigureOut">
               <a:rPr lang="en-US"/>
-              <a:t>12/23/20</a:t>
+              <a:t>12/23/2020</a:t>
             </a:fld>
             <a:endParaRPr dirty="0"/>
           </a:p>
@@ -3880,7 +4023,7 @@
           <a:p>
             <a:fld id="{9E583DDF-CA54-461A-A486-592D2374C532}" type="datetimeFigureOut">
               <a:rPr lang="en-US"/>
-              <a:t>12/23/20</a:t>
+              <a:t>12/23/2020</a:t>
             </a:fld>
             <a:endParaRPr/>
           </a:p>
@@ -4169,7 +4312,7 @@
             <a:fld id="{9E583DDF-CA54-461A-A486-592D2374C532}" type="datetimeFigureOut">
               <a:rPr lang="en-US"/>
               <a:pPr/>
-              <a:t>12/23/20</a:t>
+              <a:t>12/23/2020</a:t>
             </a:fld>
             <a:endParaRPr/>
           </a:p>
@@ -4482,7 +4625,7 @@
           <a:p>
             <a:fld id="{9DD7D43D-6574-4C7B-808D-C6C12215A4D4}" type="datetimeFigureOut">
               <a:rPr lang="en-US"/>
-              <a:t>12/23/20</a:t>
+              <a:t>12/23/2020</a:t>
             </a:fld>
             <a:endParaRPr/>
           </a:p>
@@ -4931,7 +5074,7 @@
           <a:p>
             <a:fld id="{9E583DDF-CA54-461A-A486-592D2374C532}" type="datetimeFigureOut">
               <a:rPr lang="en-US"/>
-              <a:t>12/23/20</a:t>
+              <a:t>12/23/2020</a:t>
             </a:fld>
             <a:endParaRPr/>
           </a:p>
@@ -5061,7 +5204,7 @@
           <a:p>
             <a:fld id="{9E583DDF-CA54-461A-A486-592D2374C532}" type="datetimeFigureOut">
               <a:rPr lang="en-US"/>
-              <a:t>12/23/20</a:t>
+              <a:t>12/23/2020</a:t>
             </a:fld>
             <a:endParaRPr/>
           </a:p>
@@ -5185,7 +5328,7 @@
             <a:fld id="{9E583DDF-CA54-461A-A486-592D2374C532}" type="datetimeFigureOut">
               <a:rPr lang="en-US"/>
               <a:pPr/>
-              <a:t>12/23/20</a:t>
+              <a:t>12/23/2020</a:t>
             </a:fld>
             <a:endParaRPr/>
           </a:p>
@@ -5492,7 +5635,7 @@
           <a:p>
             <a:fld id="{9E583DDF-CA54-461A-A486-592D2374C532}" type="datetimeFigureOut">
               <a:rPr lang="en-US"/>
-              <a:t>12/23/20</a:t>
+              <a:t>12/23/2020</a:t>
             </a:fld>
             <a:endParaRPr/>
           </a:p>
@@ -5848,7 +5991,7 @@
             <a:fld id="{9E583DDF-CA54-461A-A486-592D2374C532}" type="datetimeFigureOut">
               <a:rPr lang="en-US" smtClean="0"/>
               <a:pPr/>
-              <a:t>12/23/20</a:t>
+              <a:t>12/23/2020</a:t>
             </a:fld>
             <a:endParaRPr lang="en-US" dirty="0"/>
           </a:p>
@@ -6360,314 +6503,97 @@
       </p:grpSpPr>
       <p:sp>
         <p:nvSpPr>
-          <p:cNvPr id="2" name="Title 1"/>
-          <p:cNvSpPr>
-            <a:spLocks noGrp="1"/>
-          </p:cNvSpPr>
-          <p:nvPr>
-            <p:ph type="title"/>
-          </p:nvPr>
-        </p:nvSpPr>
-        <p:spPr>
-          <a:xfrm>
-            <a:off x="1524000" y="533400"/>
-            <a:ext cx="9144000" cy="1066800"/>
-          </a:xfrm>
-        </p:spPr>
-        <p:txBody>
-          <a:bodyPr/>
-          <a:lstStyle/>
-          <a:p>
-            <a:r>
-              <a:rPr lang="en-US" dirty="0"/>
-              <a:t>Data Exploration &amp; Deliverables</a:t>
-            </a:r>
-          </a:p>
-        </p:txBody>
-      </p:sp>
-      <p:sp>
-        <p:nvSpPr>
-          <p:cNvPr id="3" name="Content Placeholder 2"/>
-          <p:cNvSpPr>
-            <a:spLocks noGrp="1"/>
-          </p:cNvSpPr>
-          <p:nvPr>
-            <p:ph type="body" idx="1"/>
-          </p:nvPr>
-        </p:nvSpPr>
-        <p:spPr>
-          <a:xfrm>
-            <a:off x="1522413" y="1600200"/>
-            <a:ext cx="9144000" cy="4114800"/>
-          </a:xfrm>
-        </p:spPr>
-        <p:txBody>
-          <a:bodyPr>
-            <a:normAutofit/>
-          </a:bodyPr>
-          <a:lstStyle/>
-          <a:p>
-            <a:pPr lvl="0" algn="l"/>
-            <a:r>
-              <a:rPr lang="en-US" b="1" dirty="0">
-                <a:hlinkClick r:id="rId3"/>
-              </a:rPr>
-              <a:t>- Data Exploration Jupyter Notebook</a:t>
-            </a:r>
-            <a:endParaRPr lang="en-US" dirty="0"/>
-          </a:p>
-        </p:txBody>
-      </p:sp>
-      <p:sp>
-        <p:nvSpPr>
-          <p:cNvPr id="9" name="Content Placeholder 2">
+          <p:cNvPr id="2" name="Title 1">
             <a:extLst>
               <a:ext uri="{FF2B5EF4-FFF2-40B4-BE49-F238E27FC236}">
-                <a16:creationId xmlns:a16="http://schemas.microsoft.com/office/drawing/2014/main" id="{3D42076F-797D-48D6-9C91-5624490F9F45}"/>
+                <a16:creationId xmlns:a16="http://schemas.microsoft.com/office/drawing/2014/main" id="{4BD51FDF-D28F-A849-8CAA-3F50D8980894}"/>
               </a:ext>
             </a:extLst>
           </p:cNvPr>
-          <p:cNvSpPr txBox="1">
-            <a:spLocks/>
-          </p:cNvSpPr>
+          <p:cNvSpPr>
+            <a:spLocks noGrp="1"/>
+          </p:cNvSpPr>
+          <p:nvPr>
+            <p:ph type="title"/>
+          </p:nvPr>
+        </p:nvSpPr>
+        <p:spPr/>
+        <p:txBody>
+          <a:bodyPr/>
+          <a:lstStyle/>
+          <a:p>
+            <a:r>
+              <a:rPr lang="en-US" dirty="0"/>
+              <a:t>State over state vis</a:t>
+            </a:r>
+          </a:p>
+        </p:txBody>
+      </p:sp>
+      <p:sp>
+        <p:nvSpPr>
+          <p:cNvPr id="3" name="Text Placeholder 2">
+            <a:extLst>
+              <a:ext uri="{FF2B5EF4-FFF2-40B4-BE49-F238E27FC236}">
+                <a16:creationId xmlns:a16="http://schemas.microsoft.com/office/drawing/2014/main" id="{92350507-D243-1E42-8154-00B79400CF9E}"/>
+              </a:ext>
+            </a:extLst>
+          </p:cNvPr>
+          <p:cNvSpPr>
+            <a:spLocks noGrp="1"/>
+          </p:cNvSpPr>
+          <p:nvPr>
+            <p:ph type="body" idx="1"/>
+          </p:nvPr>
+        </p:nvSpPr>
+        <p:spPr/>
+        <p:txBody>
+          <a:bodyPr/>
+          <a:lstStyle/>
+          <a:p>
+            <a:endParaRPr lang="en-US"/>
+          </a:p>
+        </p:txBody>
+      </p:sp>
+      <p:pic>
+        <p:nvPicPr>
+          <p:cNvPr id="7" name="Picture 6" descr="Chart, bar chart&#10;&#10;Description automatically generated">
+            <a:extLst>
+              <a:ext uri="{FF2B5EF4-FFF2-40B4-BE49-F238E27FC236}">
+                <a16:creationId xmlns:a16="http://schemas.microsoft.com/office/drawing/2014/main" id="{B6362E7C-5926-4E43-BE2B-47AE92CCDA7D}"/>
+              </a:ext>
+            </a:extLst>
+          </p:cNvPr>
+          <p:cNvPicPr>
+            <a:picLocks noChangeAspect="1"/>
+          </p:cNvPicPr>
           <p:nvPr/>
-        </p:nvSpPr>
+        </p:nvPicPr>
+        <p:blipFill>
+          <a:blip r:embed="rId2">
+            <a:extLst>
+              <a:ext uri="{28A0092B-C50C-407E-A947-70E740481C1C}">
+                <a14:useLocalDpi xmlns:a14="http://schemas.microsoft.com/office/drawing/2010/main" val="0"/>
+              </a:ext>
+            </a:extLst>
+          </a:blip>
+          <a:stretch>
+            <a:fillRect/>
+          </a:stretch>
+        </p:blipFill>
         <p:spPr>
           <a:xfrm>
-            <a:off x="2132013" y="4835434"/>
-            <a:ext cx="7773987" cy="1489166"/>
+            <a:off x="1066800" y="6927"/>
+            <a:ext cx="10316296" cy="6877531"/>
           </a:xfrm>
           <a:prstGeom prst="rect">
             <a:avLst/>
           </a:prstGeom>
         </p:spPr>
-        <p:txBody>
-          <a:bodyPr vert="horz" lIns="91440" tIns="45720" rIns="91440" bIns="45720" rtlCol="0" anchor="t">
-            <a:noAutofit/>
-          </a:bodyPr>
-          <a:lstStyle>
-            <a:lvl1pPr marL="0" indent="0" algn="ctr" defTabSz="914400" rtl="0" eaLnBrk="1" latinLnBrk="0" hangingPunct="1">
-              <a:lnSpc>
-                <a:spcPct val="90000"/>
-              </a:lnSpc>
-              <a:spcBef>
-                <a:spcPts val="0"/>
-              </a:spcBef>
-              <a:buClr>
-                <a:schemeClr val="tx2"/>
-              </a:buClr>
-              <a:buSzPct val="80000"/>
-              <a:buFont typeface="Wingdings" pitchFamily="2" charset="2"/>
-              <a:buNone/>
-              <a:defRPr sz="2400" kern="1200" cap="none" baseline="0">
-                <a:solidFill>
-                  <a:schemeClr val="tx1"/>
-                </a:solidFill>
-                <a:latin typeface="+mn-lt"/>
-                <a:ea typeface="+mn-ea"/>
-                <a:cs typeface="+mn-cs"/>
-              </a:defRPr>
-            </a:lvl1pPr>
-            <a:lvl2pPr marL="457200" indent="0" algn="l" defTabSz="914400" rtl="0" eaLnBrk="1" latinLnBrk="0" hangingPunct="1">
-              <a:lnSpc>
-                <a:spcPct val="90000"/>
-              </a:lnSpc>
-              <a:spcBef>
-                <a:spcPts val="1000"/>
-              </a:spcBef>
-              <a:buClr>
-                <a:schemeClr val="tx2"/>
-              </a:buClr>
-              <a:buSzPct val="80000"/>
-              <a:buFont typeface="Wingdings" pitchFamily="2" charset="2"/>
-              <a:buNone/>
-              <a:defRPr sz="1800" kern="1200">
-                <a:solidFill>
-                  <a:schemeClr val="tx1">
-                    <a:tint val="75000"/>
-                  </a:schemeClr>
-                </a:solidFill>
-                <a:latin typeface="+mn-lt"/>
-                <a:ea typeface="+mn-ea"/>
-                <a:cs typeface="+mn-cs"/>
-              </a:defRPr>
-            </a:lvl2pPr>
-            <a:lvl3pPr marL="914400" indent="0" algn="l" defTabSz="914400" rtl="0" eaLnBrk="1" latinLnBrk="0" hangingPunct="1">
-              <a:lnSpc>
-                <a:spcPct val="90000"/>
-              </a:lnSpc>
-              <a:spcBef>
-                <a:spcPts val="800"/>
-              </a:spcBef>
-              <a:buClr>
-                <a:schemeClr val="tx2"/>
-              </a:buClr>
-              <a:buSzPct val="80000"/>
-              <a:buFont typeface="Wingdings" pitchFamily="2" charset="2"/>
-              <a:buNone/>
-              <a:defRPr sz="1600" kern="1200">
-                <a:solidFill>
-                  <a:schemeClr val="tx1">
-                    <a:tint val="75000"/>
-                  </a:schemeClr>
-                </a:solidFill>
-                <a:latin typeface="+mn-lt"/>
-                <a:ea typeface="+mn-ea"/>
-                <a:cs typeface="+mn-cs"/>
-              </a:defRPr>
-            </a:lvl3pPr>
-            <a:lvl4pPr marL="1371600" indent="0" algn="l" defTabSz="914400" rtl="0" eaLnBrk="1" latinLnBrk="0" hangingPunct="1">
-              <a:lnSpc>
-                <a:spcPct val="90000"/>
-              </a:lnSpc>
-              <a:spcBef>
-                <a:spcPts val="800"/>
-              </a:spcBef>
-              <a:buClr>
-                <a:schemeClr val="tx2"/>
-              </a:buClr>
-              <a:buSzPct val="80000"/>
-              <a:buFont typeface="Wingdings" pitchFamily="2" charset="2"/>
-              <a:buNone/>
-              <a:defRPr sz="1400" kern="1200">
-                <a:solidFill>
-                  <a:schemeClr val="tx1">
-                    <a:tint val="75000"/>
-                  </a:schemeClr>
-                </a:solidFill>
-                <a:latin typeface="+mn-lt"/>
-                <a:ea typeface="+mn-ea"/>
-                <a:cs typeface="+mn-cs"/>
-              </a:defRPr>
-            </a:lvl4pPr>
-            <a:lvl5pPr marL="1828800" indent="0" algn="l" defTabSz="914400" rtl="0" eaLnBrk="1" latinLnBrk="0" hangingPunct="1">
-              <a:lnSpc>
-                <a:spcPct val="90000"/>
-              </a:lnSpc>
-              <a:spcBef>
-                <a:spcPts val="800"/>
-              </a:spcBef>
-              <a:buClr>
-                <a:schemeClr val="tx2"/>
-              </a:buClr>
-              <a:buSzPct val="80000"/>
-              <a:buFont typeface="Wingdings" pitchFamily="2" charset="2"/>
-              <a:buNone/>
-              <a:defRPr sz="1400" kern="1200">
-                <a:solidFill>
-                  <a:schemeClr val="tx1">
-                    <a:tint val="75000"/>
-                  </a:schemeClr>
-                </a:solidFill>
-                <a:latin typeface="+mn-lt"/>
-                <a:ea typeface="+mn-ea"/>
-                <a:cs typeface="+mn-cs"/>
-              </a:defRPr>
-            </a:lvl5pPr>
-            <a:lvl6pPr marL="2286000" indent="0" algn="l" defTabSz="914400" rtl="0" eaLnBrk="1" latinLnBrk="0" hangingPunct="1">
-              <a:lnSpc>
-                <a:spcPct val="90000"/>
-              </a:lnSpc>
-              <a:spcBef>
-                <a:spcPts val="800"/>
-              </a:spcBef>
-              <a:buSzPct val="80000"/>
-              <a:buFont typeface="Wingdings" pitchFamily="2" charset="2"/>
-              <a:buNone/>
-              <a:defRPr sz="1400" kern="1200">
-                <a:solidFill>
-                  <a:schemeClr val="tx1">
-                    <a:tint val="75000"/>
-                  </a:schemeClr>
-                </a:solidFill>
-                <a:latin typeface="+mn-lt"/>
-                <a:ea typeface="+mn-ea"/>
-                <a:cs typeface="+mn-cs"/>
-              </a:defRPr>
-            </a:lvl6pPr>
-            <a:lvl7pPr marL="2743200" indent="0" algn="l" defTabSz="914400" rtl="0" eaLnBrk="1" latinLnBrk="0" hangingPunct="1">
-              <a:lnSpc>
-                <a:spcPct val="90000"/>
-              </a:lnSpc>
-              <a:spcBef>
-                <a:spcPts val="800"/>
-              </a:spcBef>
-              <a:buSzPct val="80000"/>
-              <a:buFont typeface="Wingdings" pitchFamily="2" charset="2"/>
-              <a:buNone/>
-              <a:defRPr sz="1400" kern="1200" baseline="0">
-                <a:solidFill>
-                  <a:schemeClr val="tx1">
-                    <a:tint val="75000"/>
-                  </a:schemeClr>
-                </a:solidFill>
-                <a:latin typeface="+mn-lt"/>
-                <a:ea typeface="+mn-ea"/>
-                <a:cs typeface="+mn-cs"/>
-              </a:defRPr>
-            </a:lvl7pPr>
-            <a:lvl8pPr marL="3200400" indent="0" algn="l" defTabSz="914400" rtl="0" eaLnBrk="1" latinLnBrk="0" hangingPunct="1">
-              <a:lnSpc>
-                <a:spcPct val="90000"/>
-              </a:lnSpc>
-              <a:spcBef>
-                <a:spcPts val="800"/>
-              </a:spcBef>
-              <a:buSzPct val="80000"/>
-              <a:buFont typeface="Wingdings" pitchFamily="2" charset="2"/>
-              <a:buNone/>
-              <a:defRPr sz="1400" kern="1200" baseline="0">
-                <a:solidFill>
-                  <a:schemeClr val="tx1">
-                    <a:tint val="75000"/>
-                  </a:schemeClr>
-                </a:solidFill>
-                <a:latin typeface="+mn-lt"/>
-                <a:ea typeface="+mn-ea"/>
-                <a:cs typeface="+mn-cs"/>
-              </a:defRPr>
-            </a:lvl8pPr>
-            <a:lvl9pPr marL="3657600" indent="0" algn="l" defTabSz="914400" rtl="0" eaLnBrk="1" latinLnBrk="0" hangingPunct="1">
-              <a:lnSpc>
-                <a:spcPct val="90000"/>
-              </a:lnSpc>
-              <a:spcBef>
-                <a:spcPts val="800"/>
-              </a:spcBef>
-              <a:buSzPct val="80000"/>
-              <a:buFont typeface="Wingdings" pitchFamily="2" charset="2"/>
-              <a:buNone/>
-              <a:defRPr sz="1400" kern="1200" baseline="0">
-                <a:solidFill>
-                  <a:schemeClr val="tx1">
-                    <a:tint val="75000"/>
-                  </a:schemeClr>
-                </a:solidFill>
-                <a:latin typeface="+mn-lt"/>
-                <a:ea typeface="+mn-ea"/>
-                <a:cs typeface="+mn-cs"/>
-              </a:defRPr>
-            </a:lvl9pPr>
-          </a:lstStyle>
-          <a:p>
-            <a:pPr marL="45720"/>
-            <a:r>
-              <a:rPr lang="en-US" sz="1400" i="1" dirty="0">
-                <a:solidFill>
-                  <a:schemeClr val="accent1"/>
-                </a:solidFill>
-                <a:latin typeface="Arial" panose="020B0604020202020204" pitchFamily="34" charset="0"/>
-                <a:cs typeface="Arial" panose="020B0604020202020204" pitchFamily="34" charset="0"/>
-              </a:rPr>
-              <a:t>\</a:t>
-            </a:r>
-          </a:p>
-        </p:txBody>
-      </p:sp>
+      </p:pic>
     </p:spTree>
     <p:extLst>
       <p:ext uri="{BB962C8B-B14F-4D97-AF65-F5344CB8AC3E}">
-        <p14:creationId xmlns:p14="http://schemas.microsoft.com/office/powerpoint/2010/main" val="3079293833"/>
+        <p14:creationId xmlns:p14="http://schemas.microsoft.com/office/powerpoint/2010/main" val="4020381891"/>
       </p:ext>
     </p:extLst>
   </p:cSld>
@@ -6728,7 +6654,7 @@
           <a:p>
             <a:r>
               <a:rPr lang="en-US" dirty="0"/>
-              <a:t>Data Analysis</a:t>
+              <a:t>Data Exploration &amp; Deliverables</a:t>
             </a:r>
           </a:p>
         </p:txBody>
@@ -6745,7 +6671,7 @@
         </p:nvSpPr>
         <p:spPr>
           <a:xfrm>
-            <a:off x="1524000" y="1600200"/>
+            <a:off x="1522413" y="1600200"/>
             <a:ext cx="9144000" cy="4114800"/>
           </a:xfrm>
         </p:spPr>
@@ -6760,32 +6686,262 @@
               <a:rPr lang="en-US" b="1" dirty="0">
                 <a:hlinkClick r:id="rId3"/>
               </a:rPr>
-              <a:t>- Visualizations </a:t>
-            </a:r>
-            <a:r>
-              <a:rPr lang="en-US" b="1" dirty="0" err="1">
-                <a:hlinkClick r:id="rId3"/>
+              <a:t>- Data Exploration Jupyter Notebook</a:t>
+            </a:r>
+            <a:endParaRPr lang="en-US" dirty="0"/>
+          </a:p>
+        </p:txBody>
+      </p:sp>
+      <p:sp>
+        <p:nvSpPr>
+          <p:cNvPr id="9" name="Content Placeholder 2">
+            <a:extLst>
+              <a:ext uri="{FF2B5EF4-FFF2-40B4-BE49-F238E27FC236}">
+                <a16:creationId xmlns:a16="http://schemas.microsoft.com/office/drawing/2014/main" id="{3D42076F-797D-48D6-9C91-5624490F9F45}"/>
+              </a:ext>
+            </a:extLst>
+          </p:cNvPr>
+          <p:cNvSpPr txBox="1">
+            <a:spLocks/>
+          </p:cNvSpPr>
+          <p:nvPr/>
+        </p:nvSpPr>
+        <p:spPr>
+          <a:xfrm>
+            <a:off x="2132013" y="4835434"/>
+            <a:ext cx="7773987" cy="1489166"/>
+          </a:xfrm>
+          <a:prstGeom prst="rect">
+            <a:avLst/>
+          </a:prstGeom>
+        </p:spPr>
+        <p:txBody>
+          <a:bodyPr vert="horz" lIns="91440" tIns="45720" rIns="91440" bIns="45720" rtlCol="0" anchor="t">
+            <a:noAutofit/>
+          </a:bodyPr>
+          <a:lstStyle>
+            <a:lvl1pPr marL="0" indent="0" algn="ctr" defTabSz="914400" rtl="0" eaLnBrk="1" latinLnBrk="0" hangingPunct="1">
+              <a:lnSpc>
+                <a:spcPct val="90000"/>
+              </a:lnSpc>
+              <a:spcBef>
+                <a:spcPts val="0"/>
+              </a:spcBef>
+              <a:buClr>
+                <a:schemeClr val="tx2"/>
+              </a:buClr>
+              <a:buSzPct val="80000"/>
+              <a:buFont typeface="Wingdings" pitchFamily="2" charset="2"/>
+              <a:buNone/>
+              <a:defRPr sz="2400" kern="1200" cap="none" baseline="0">
+                <a:solidFill>
+                  <a:schemeClr val="tx1"/>
+                </a:solidFill>
+                <a:latin typeface="+mn-lt"/>
+                <a:ea typeface="+mn-ea"/>
+                <a:cs typeface="+mn-cs"/>
+              </a:defRPr>
+            </a:lvl1pPr>
+            <a:lvl2pPr marL="457200" indent="0" algn="l" defTabSz="914400" rtl="0" eaLnBrk="1" latinLnBrk="0" hangingPunct="1">
+              <a:lnSpc>
+                <a:spcPct val="90000"/>
+              </a:lnSpc>
+              <a:spcBef>
+                <a:spcPts val="1000"/>
+              </a:spcBef>
+              <a:buClr>
+                <a:schemeClr val="tx2"/>
+              </a:buClr>
+              <a:buSzPct val="80000"/>
+              <a:buFont typeface="Wingdings" pitchFamily="2" charset="2"/>
+              <a:buNone/>
+              <a:defRPr sz="1800" kern="1200">
+                <a:solidFill>
+                  <a:schemeClr val="tx1">
+                    <a:tint val="75000"/>
+                  </a:schemeClr>
+                </a:solidFill>
+                <a:latin typeface="+mn-lt"/>
+                <a:ea typeface="+mn-ea"/>
+                <a:cs typeface="+mn-cs"/>
+              </a:defRPr>
+            </a:lvl2pPr>
+            <a:lvl3pPr marL="914400" indent="0" algn="l" defTabSz="914400" rtl="0" eaLnBrk="1" latinLnBrk="0" hangingPunct="1">
+              <a:lnSpc>
+                <a:spcPct val="90000"/>
+              </a:lnSpc>
+              <a:spcBef>
+                <a:spcPts val="800"/>
+              </a:spcBef>
+              <a:buClr>
+                <a:schemeClr val="tx2"/>
+              </a:buClr>
+              <a:buSzPct val="80000"/>
+              <a:buFont typeface="Wingdings" pitchFamily="2" charset="2"/>
+              <a:buNone/>
+              <a:defRPr sz="1600" kern="1200">
+                <a:solidFill>
+                  <a:schemeClr val="tx1">
+                    <a:tint val="75000"/>
+                  </a:schemeClr>
+                </a:solidFill>
+                <a:latin typeface="+mn-lt"/>
+                <a:ea typeface="+mn-ea"/>
+                <a:cs typeface="+mn-cs"/>
+              </a:defRPr>
+            </a:lvl3pPr>
+            <a:lvl4pPr marL="1371600" indent="0" algn="l" defTabSz="914400" rtl="0" eaLnBrk="1" latinLnBrk="0" hangingPunct="1">
+              <a:lnSpc>
+                <a:spcPct val="90000"/>
+              </a:lnSpc>
+              <a:spcBef>
+                <a:spcPts val="800"/>
+              </a:spcBef>
+              <a:buClr>
+                <a:schemeClr val="tx2"/>
+              </a:buClr>
+              <a:buSzPct val="80000"/>
+              <a:buFont typeface="Wingdings" pitchFamily="2" charset="2"/>
+              <a:buNone/>
+              <a:defRPr sz="1400" kern="1200">
+                <a:solidFill>
+                  <a:schemeClr val="tx1">
+                    <a:tint val="75000"/>
+                  </a:schemeClr>
+                </a:solidFill>
+                <a:latin typeface="+mn-lt"/>
+                <a:ea typeface="+mn-ea"/>
+                <a:cs typeface="+mn-cs"/>
+              </a:defRPr>
+            </a:lvl4pPr>
+            <a:lvl5pPr marL="1828800" indent="0" algn="l" defTabSz="914400" rtl="0" eaLnBrk="1" latinLnBrk="0" hangingPunct="1">
+              <a:lnSpc>
+                <a:spcPct val="90000"/>
+              </a:lnSpc>
+              <a:spcBef>
+                <a:spcPts val="800"/>
+              </a:spcBef>
+              <a:buClr>
+                <a:schemeClr val="tx2"/>
+              </a:buClr>
+              <a:buSzPct val="80000"/>
+              <a:buFont typeface="Wingdings" pitchFamily="2" charset="2"/>
+              <a:buNone/>
+              <a:defRPr sz="1400" kern="1200">
+                <a:solidFill>
+                  <a:schemeClr val="tx1">
+                    <a:tint val="75000"/>
+                  </a:schemeClr>
+                </a:solidFill>
+                <a:latin typeface="+mn-lt"/>
+                <a:ea typeface="+mn-ea"/>
+                <a:cs typeface="+mn-cs"/>
+              </a:defRPr>
+            </a:lvl5pPr>
+            <a:lvl6pPr marL="2286000" indent="0" algn="l" defTabSz="914400" rtl="0" eaLnBrk="1" latinLnBrk="0" hangingPunct="1">
+              <a:lnSpc>
+                <a:spcPct val="90000"/>
+              </a:lnSpc>
+              <a:spcBef>
+                <a:spcPts val="800"/>
+              </a:spcBef>
+              <a:buSzPct val="80000"/>
+              <a:buFont typeface="Wingdings" pitchFamily="2" charset="2"/>
+              <a:buNone/>
+              <a:defRPr sz="1400" kern="1200">
+                <a:solidFill>
+                  <a:schemeClr val="tx1">
+                    <a:tint val="75000"/>
+                  </a:schemeClr>
+                </a:solidFill>
+                <a:latin typeface="+mn-lt"/>
+                <a:ea typeface="+mn-ea"/>
+                <a:cs typeface="+mn-cs"/>
+              </a:defRPr>
+            </a:lvl6pPr>
+            <a:lvl7pPr marL="2743200" indent="0" algn="l" defTabSz="914400" rtl="0" eaLnBrk="1" latinLnBrk="0" hangingPunct="1">
+              <a:lnSpc>
+                <a:spcPct val="90000"/>
+              </a:lnSpc>
+              <a:spcBef>
+                <a:spcPts val="800"/>
+              </a:spcBef>
+              <a:buSzPct val="80000"/>
+              <a:buFont typeface="Wingdings" pitchFamily="2" charset="2"/>
+              <a:buNone/>
+              <a:defRPr sz="1400" kern="1200" baseline="0">
+                <a:solidFill>
+                  <a:schemeClr val="tx1">
+                    <a:tint val="75000"/>
+                  </a:schemeClr>
+                </a:solidFill>
+                <a:latin typeface="+mn-lt"/>
+                <a:ea typeface="+mn-ea"/>
+                <a:cs typeface="+mn-cs"/>
+              </a:defRPr>
+            </a:lvl7pPr>
+            <a:lvl8pPr marL="3200400" indent="0" algn="l" defTabSz="914400" rtl="0" eaLnBrk="1" latinLnBrk="0" hangingPunct="1">
+              <a:lnSpc>
+                <a:spcPct val="90000"/>
+              </a:lnSpc>
+              <a:spcBef>
+                <a:spcPts val="800"/>
+              </a:spcBef>
+              <a:buSzPct val="80000"/>
+              <a:buFont typeface="Wingdings" pitchFamily="2" charset="2"/>
+              <a:buNone/>
+              <a:defRPr sz="1400" kern="1200" baseline="0">
+                <a:solidFill>
+                  <a:schemeClr val="tx1">
+                    <a:tint val="75000"/>
+                  </a:schemeClr>
+                </a:solidFill>
+                <a:latin typeface="+mn-lt"/>
+                <a:ea typeface="+mn-ea"/>
+                <a:cs typeface="+mn-cs"/>
+              </a:defRPr>
+            </a:lvl8pPr>
+            <a:lvl9pPr marL="3657600" indent="0" algn="l" defTabSz="914400" rtl="0" eaLnBrk="1" latinLnBrk="0" hangingPunct="1">
+              <a:lnSpc>
+                <a:spcPct val="90000"/>
+              </a:lnSpc>
+              <a:spcBef>
+                <a:spcPts val="800"/>
+              </a:spcBef>
+              <a:buSzPct val="80000"/>
+              <a:buFont typeface="Wingdings" pitchFamily="2" charset="2"/>
+              <a:buNone/>
+              <a:defRPr sz="1400" kern="1200" baseline="0">
+                <a:solidFill>
+                  <a:schemeClr val="tx1">
+                    <a:tint val="75000"/>
+                  </a:schemeClr>
+                </a:solidFill>
+                <a:latin typeface="+mn-lt"/>
+                <a:ea typeface="+mn-ea"/>
+                <a:cs typeface="+mn-cs"/>
+              </a:defRPr>
+            </a:lvl9pPr>
+          </a:lstStyle>
+          <a:p>
+            <a:pPr marL="45720"/>
+            <a:r>
+              <a:rPr lang="en-US" sz="1400" i="1" dirty="0">
+                <a:solidFill>
+                  <a:schemeClr val="accent1"/>
+                </a:solidFill>
+                <a:latin typeface="Arial" panose="020B0604020202020204" pitchFamily="34" charset="0"/>
+                <a:cs typeface="Arial" panose="020B0604020202020204" pitchFamily="34" charset="0"/>
               </a:rPr>
-              <a:t>Jupyter</a:t>
-            </a:r>
-            <a:r>
-              <a:rPr lang="en-US" b="1" dirty="0">
-                <a:hlinkClick r:id="rId3"/>
-              </a:rPr>
-              <a:t> Notebook</a:t>
-            </a:r>
-            <a:endParaRPr lang="en-US" dirty="0"/>
-          </a:p>
-          <a:p>
-            <a:pPr lvl="0" algn="l"/>
-            <a:endParaRPr lang="en-US" dirty="0"/>
+              <a:t>\</a:t>
+            </a:r>
           </a:p>
         </p:txBody>
       </p:sp>
     </p:spTree>
     <p:extLst>
       <p:ext uri="{BB962C8B-B14F-4D97-AF65-F5344CB8AC3E}">
-        <p14:creationId xmlns:p14="http://schemas.microsoft.com/office/powerpoint/2010/main" val="108080774"/>
+        <p14:creationId xmlns:p14="http://schemas.microsoft.com/office/powerpoint/2010/main" val="3079293833"/>
       </p:ext>
     </p:extLst>
   </p:cSld>
@@ -6846,6 +7002,124 @@
           <a:p>
             <a:r>
               <a:rPr lang="en-US" dirty="0"/>
+              <a:t>Data Analysis</a:t>
+            </a:r>
+          </a:p>
+        </p:txBody>
+      </p:sp>
+      <p:sp>
+        <p:nvSpPr>
+          <p:cNvPr id="3" name="Content Placeholder 2"/>
+          <p:cNvSpPr>
+            <a:spLocks noGrp="1"/>
+          </p:cNvSpPr>
+          <p:nvPr>
+            <p:ph type="body" idx="1"/>
+          </p:nvPr>
+        </p:nvSpPr>
+        <p:spPr>
+          <a:xfrm>
+            <a:off x="1524000" y="1600200"/>
+            <a:ext cx="9144000" cy="4114800"/>
+          </a:xfrm>
+        </p:spPr>
+        <p:txBody>
+          <a:bodyPr>
+            <a:normAutofit/>
+          </a:bodyPr>
+          <a:lstStyle/>
+          <a:p>
+            <a:pPr lvl="0" algn="l"/>
+            <a:r>
+              <a:rPr lang="en-US" b="1" dirty="0">
+                <a:hlinkClick r:id="rId3"/>
+              </a:rPr>
+              <a:t>- Visualizations </a:t>
+            </a:r>
+            <a:r>
+              <a:rPr lang="en-US" b="1" dirty="0" err="1">
+                <a:hlinkClick r:id="rId3"/>
+              </a:rPr>
+              <a:t>Jupyter</a:t>
+            </a:r>
+            <a:r>
+              <a:rPr lang="en-US" b="1" dirty="0">
+                <a:hlinkClick r:id="rId3"/>
+              </a:rPr>
+              <a:t> Notebook</a:t>
+            </a:r>
+            <a:endParaRPr lang="en-US" dirty="0"/>
+          </a:p>
+          <a:p>
+            <a:pPr lvl="0" algn="l"/>
+            <a:endParaRPr lang="en-US" dirty="0"/>
+          </a:p>
+        </p:txBody>
+      </p:sp>
+    </p:spTree>
+    <p:extLst>
+      <p:ext uri="{BB962C8B-B14F-4D97-AF65-F5344CB8AC3E}">
+        <p14:creationId xmlns:p14="http://schemas.microsoft.com/office/powerpoint/2010/main" val="108080774"/>
+      </p:ext>
+    </p:extLst>
+  </p:cSld>
+  <p:clrMapOvr>
+    <a:masterClrMapping/>
+  </p:clrMapOvr>
+  <mc:AlternateContent xmlns:mc="http://schemas.openxmlformats.org/markup-compatibility/2006" xmlns:p14="http://schemas.microsoft.com/office/powerpoint/2010/main">
+    <mc:Choice Requires="p14">
+      <p:transition spd="med" p14:dur="700">
+        <p:fade/>
+      </p:transition>
+    </mc:Choice>
+    <mc:Fallback xmlns="">
+      <p:transition spd="med">
+        <p:fade/>
+      </p:transition>
+    </mc:Fallback>
+  </mc:AlternateContent>
+</p:sld>
+</file>
+
+<file path=ppt/slides/slide13.xml><?xml version="1.0" encoding="utf-8"?>
+<p:sld xmlns:a="http://schemas.openxmlformats.org/drawingml/2006/main" xmlns:r="http://schemas.openxmlformats.org/officeDocument/2006/relationships" xmlns:p="http://schemas.openxmlformats.org/presentationml/2006/main">
+  <p:cSld>
+    <p:spTree>
+      <p:nvGrpSpPr>
+        <p:cNvPr id="1" name=""/>
+        <p:cNvGrpSpPr/>
+        <p:nvPr/>
+      </p:nvGrpSpPr>
+      <p:grpSpPr>
+        <a:xfrm>
+          <a:off x="0" y="0"/>
+          <a:ext cx="0" cy="0"/>
+          <a:chOff x="0" y="0"/>
+          <a:chExt cx="0" cy="0"/>
+        </a:xfrm>
+      </p:grpSpPr>
+      <p:sp>
+        <p:nvSpPr>
+          <p:cNvPr id="2" name="Title 1"/>
+          <p:cNvSpPr>
+            <a:spLocks noGrp="1"/>
+          </p:cNvSpPr>
+          <p:nvPr>
+            <p:ph type="title"/>
+          </p:nvPr>
+        </p:nvSpPr>
+        <p:spPr>
+          <a:xfrm>
+            <a:off x="1524000" y="533400"/>
+            <a:ext cx="9144000" cy="1066800"/>
+          </a:xfrm>
+        </p:spPr>
+        <p:txBody>
+          <a:bodyPr/>
+          <a:lstStyle/>
+          <a:p>
+            <a:r>
+              <a:rPr lang="en-US" dirty="0"/>
               <a:t>Post Mortem</a:t>
             </a:r>
           </a:p>
@@ -6986,7 +7260,7 @@
 </p:sld>
 </file>
 
-<file path=ppt/slides/slide13.xml><?xml version="1.0" encoding="utf-8"?>
+<file path=ppt/slides/slide14.xml><?xml version="1.0" encoding="utf-8"?>
 <p:sld xmlns:a="http://schemas.openxmlformats.org/drawingml/2006/main" xmlns:r="http://schemas.openxmlformats.org/officeDocument/2006/relationships" xmlns:p="http://schemas.openxmlformats.org/presentationml/2006/main">
   <p:cSld>
     <p:spTree>
@@ -7944,6 +8218,225 @@
           <a:p>
             <a:r>
               <a:rPr lang="en-US" dirty="0"/>
+              <a:t>Data Sources</a:t>
+            </a:r>
+          </a:p>
+        </p:txBody>
+      </p:sp>
+      <p:sp>
+        <p:nvSpPr>
+          <p:cNvPr id="3" name="Content Placeholder 2"/>
+          <p:cNvSpPr>
+            <a:spLocks noGrp="1"/>
+          </p:cNvSpPr>
+          <p:nvPr>
+            <p:ph type="body" idx="1"/>
+          </p:nvPr>
+        </p:nvSpPr>
+        <p:spPr>
+          <a:xfrm>
+            <a:off x="762000" y="1828800"/>
+            <a:ext cx="10820400" cy="3429000"/>
+          </a:xfrm>
+        </p:spPr>
+        <p:txBody>
+          <a:bodyPr>
+            <a:normAutofit fontScale="92500" lnSpcReduction="10000"/>
+          </a:bodyPr>
+          <a:lstStyle/>
+          <a:p>
+            <a:pPr lvl="0" algn="l"/>
+            <a:r>
+              <a:rPr lang="en-US" b="1" dirty="0"/>
+              <a:t>US National Parks Website</a:t>
+            </a:r>
+          </a:p>
+          <a:p>
+            <a:pPr marL="342900" lvl="0" indent="-342900" algn="l">
+              <a:buFont typeface="Arial" panose="020B0604020202020204" pitchFamily="34" charset="0"/>
+              <a:buChar char="•"/>
+            </a:pPr>
+            <a:r>
+              <a:rPr lang="en-US" dirty="0"/>
+              <a:t>Monthly visit stats for 2017-2020 (csv)</a:t>
+            </a:r>
+          </a:p>
+          <a:p>
+            <a:pPr marL="342900" lvl="0" indent="-342900" algn="l">
+              <a:buFont typeface="Arial" panose="020B0604020202020204" pitchFamily="34" charset="0"/>
+              <a:buChar char="•"/>
+            </a:pPr>
+            <a:r>
+              <a:rPr lang="en-US" dirty="0"/>
+              <a:t>Base park information (csv)</a:t>
+            </a:r>
+          </a:p>
+          <a:p>
+            <a:pPr marL="342900" lvl="0" indent="-342900" algn="l">
+              <a:buFont typeface="Arial" panose="020B0604020202020204" pitchFamily="34" charset="0"/>
+              <a:buChar char="•"/>
+            </a:pPr>
+            <a:endParaRPr lang="en-US" dirty="0"/>
+          </a:p>
+          <a:p>
+            <a:pPr lvl="0" algn="l"/>
+            <a:r>
+              <a:rPr lang="en-US" b="1" dirty="0"/>
+              <a:t>Kaggle</a:t>
+            </a:r>
+          </a:p>
+          <a:p>
+            <a:pPr marL="342900" lvl="0" indent="-342900" algn="l">
+              <a:buFont typeface="Arial" panose="020B0604020202020204" pitchFamily="34" charset="0"/>
+              <a:buChar char="•"/>
+            </a:pPr>
+            <a:r>
+              <a:rPr lang="en-US" dirty="0"/>
+              <a:t>State Emergency Orders Issued (Excel)</a:t>
+            </a:r>
+          </a:p>
+          <a:p>
+            <a:pPr marL="342900" lvl="0" indent="-342900" algn="l">
+              <a:buFont typeface="Arial" panose="020B0604020202020204" pitchFamily="34" charset="0"/>
+              <a:buChar char="•"/>
+            </a:pPr>
+            <a:endParaRPr lang="en-US" dirty="0"/>
+          </a:p>
+          <a:p>
+            <a:pPr lvl="0" algn="l"/>
+            <a:r>
+              <a:rPr lang="en-US" b="1" dirty="0"/>
+              <a:t>Google</a:t>
+            </a:r>
+          </a:p>
+          <a:p>
+            <a:pPr marL="342900" lvl="0" indent="-342900" algn="l">
+              <a:buFont typeface="Arial" panose="020B0604020202020204" pitchFamily="34" charset="0"/>
+              <a:buChar char="•"/>
+            </a:pPr>
+            <a:r>
+              <a:rPr lang="en-US" dirty="0"/>
+              <a:t>Park geocoordinates (API)</a:t>
+            </a:r>
+          </a:p>
+          <a:p>
+            <a:pPr marL="342900" lvl="0" indent="-342900" algn="l">
+              <a:buFont typeface="Arial" panose="020B0604020202020204" pitchFamily="34" charset="0"/>
+              <a:buChar char="•"/>
+            </a:pPr>
+            <a:endParaRPr lang="en-US" dirty="0"/>
+          </a:p>
+          <a:p>
+            <a:pPr lvl="0" algn="l"/>
+            <a:r>
+              <a:rPr lang="en-US" b="1" dirty="0"/>
+              <a:t>WILDFIRES</a:t>
+            </a:r>
+          </a:p>
+          <a:p>
+            <a:pPr marL="342900" lvl="0" indent="-342900" algn="l">
+              <a:buFont typeface="Arial" panose="020B0604020202020204" pitchFamily="34" charset="0"/>
+              <a:buChar char="•"/>
+            </a:pPr>
+            <a:r>
+              <a:rPr lang="en-US" dirty="0"/>
+              <a:t>2020 Wildfires by month </a:t>
+            </a:r>
+          </a:p>
+          <a:p>
+            <a:pPr marL="342900" lvl="0" indent="-342900" algn="l">
+              <a:buFont typeface="Arial" panose="020B0604020202020204" pitchFamily="34" charset="0"/>
+              <a:buChar char="•"/>
+            </a:pPr>
+            <a:endParaRPr lang="en-US" dirty="0"/>
+          </a:p>
+          <a:p>
+            <a:pPr marL="342900" lvl="0" indent="-342900" algn="l">
+              <a:buFont typeface="Arial" panose="020B0604020202020204" pitchFamily="34" charset="0"/>
+              <a:buChar char="•"/>
+            </a:pPr>
+            <a:endParaRPr lang="en-US" dirty="0"/>
+          </a:p>
+          <a:p>
+            <a:pPr marL="342900" lvl="0" indent="-342900" algn="l">
+              <a:buFont typeface="Arial" panose="020B0604020202020204" pitchFamily="34" charset="0"/>
+              <a:buChar char="•"/>
+            </a:pPr>
+            <a:endParaRPr lang="en-US" dirty="0"/>
+          </a:p>
+          <a:p>
+            <a:pPr marL="342900" lvl="0" indent="-342900" algn="l">
+              <a:buFont typeface="Arial" panose="020B0604020202020204" pitchFamily="34" charset="0"/>
+              <a:buChar char="•"/>
+            </a:pPr>
+            <a:endParaRPr lang="en-US" dirty="0"/>
+          </a:p>
+        </p:txBody>
+      </p:sp>
+    </p:spTree>
+    <p:extLst>
+      <p:ext uri="{BB962C8B-B14F-4D97-AF65-F5344CB8AC3E}">
+        <p14:creationId xmlns:p14="http://schemas.microsoft.com/office/powerpoint/2010/main" val="1657919454"/>
+      </p:ext>
+    </p:extLst>
+  </p:cSld>
+  <p:clrMapOvr>
+    <a:masterClrMapping/>
+  </p:clrMapOvr>
+  <mc:AlternateContent xmlns:mc="http://schemas.openxmlformats.org/markup-compatibility/2006">
+    <mc:Choice xmlns:p14="http://schemas.microsoft.com/office/powerpoint/2010/main" Requires="p14">
+      <p:transition spd="med" p14:dur="700">
+        <p:fade/>
+      </p:transition>
+    </mc:Choice>
+    <mc:Fallback>
+      <p:transition spd="med">
+        <p:fade/>
+      </p:transition>
+    </mc:Fallback>
+  </mc:AlternateContent>
+</p:sld>
+</file>
+
+<file path=ppt/slides/slide5.xml><?xml version="1.0" encoding="utf-8"?>
+<p:sld xmlns:a="http://schemas.openxmlformats.org/drawingml/2006/main" xmlns:r="http://schemas.openxmlformats.org/officeDocument/2006/relationships" xmlns:p="http://schemas.openxmlformats.org/presentationml/2006/main">
+  <p:cSld>
+    <p:spTree>
+      <p:nvGrpSpPr>
+        <p:cNvPr id="1" name=""/>
+        <p:cNvGrpSpPr/>
+        <p:nvPr/>
+      </p:nvGrpSpPr>
+      <p:grpSpPr>
+        <a:xfrm>
+          <a:off x="0" y="0"/>
+          <a:ext cx="0" cy="0"/>
+          <a:chOff x="0" y="0"/>
+          <a:chExt cx="0" cy="0"/>
+        </a:xfrm>
+      </p:grpSpPr>
+      <p:sp>
+        <p:nvSpPr>
+          <p:cNvPr id="2" name="Title 1"/>
+          <p:cNvSpPr>
+            <a:spLocks noGrp="1"/>
+          </p:cNvSpPr>
+          <p:nvPr>
+            <p:ph type="title"/>
+          </p:nvPr>
+        </p:nvSpPr>
+        <p:spPr>
+          <a:xfrm>
+            <a:off x="1524000" y="533400"/>
+            <a:ext cx="9144000" cy="1066800"/>
+          </a:xfrm>
+        </p:spPr>
+        <p:txBody>
+          <a:bodyPr/>
+          <a:lstStyle/>
+          <a:p>
+            <a:r>
+              <a:rPr lang="en-US" dirty="0"/>
               <a:t>Three Main Questions</a:t>
             </a:r>
           </a:p>
@@ -8213,7 +8706,7 @@
 </p:sld>
 </file>
 
-<file path=ppt/slides/slide5.xml><?xml version="1.0" encoding="utf-8"?>
+<file path=ppt/slides/slide6.xml><?xml version="1.0" encoding="utf-8"?>
 <p:sld xmlns:a="http://schemas.openxmlformats.org/drawingml/2006/main" xmlns:r="http://schemas.openxmlformats.org/officeDocument/2006/relationships" xmlns:p="http://schemas.openxmlformats.org/presentationml/2006/main">
   <p:cSld>
     <p:spTree>
@@ -8344,7 +8837,7 @@
 </p:sld>
 </file>
 
-<file path=ppt/slides/slide6.xml><?xml version="1.0" encoding="utf-8"?>
+<file path=ppt/slides/slide7.xml><?xml version="1.0" encoding="utf-8"?>
 <p:sld xmlns:a="http://schemas.openxmlformats.org/drawingml/2006/main" xmlns:r="http://schemas.openxmlformats.org/officeDocument/2006/relationships" xmlns:p="http://schemas.openxmlformats.org/presentationml/2006/main">
   <p:cSld>
     <p:spTree>
@@ -8472,7 +8965,7 @@
 </p:sld>
 </file>
 
-<file path=ppt/slides/slide7.xml><?xml version="1.0" encoding="utf-8"?>
+<file path=ppt/slides/slide8.xml><?xml version="1.0" encoding="utf-8"?>
 <p:sld xmlns:a="http://schemas.openxmlformats.org/drawingml/2006/main" xmlns:r="http://schemas.openxmlformats.org/officeDocument/2006/relationships" xmlns:p="http://schemas.openxmlformats.org/presentationml/2006/main">
   <p:cSld>
     <p:spTree>
@@ -8642,7 +9135,7 @@
 </p:sld>
 </file>
 
-<file path=ppt/slides/slide8.xml><?xml version="1.0" encoding="utf-8"?>
+<file path=ppt/slides/slide9.xml><?xml version="1.0" encoding="utf-8"?>
 <p:sld xmlns:a="http://schemas.openxmlformats.org/drawingml/2006/main" xmlns:r="http://schemas.openxmlformats.org/officeDocument/2006/relationships" xmlns:p="http://schemas.openxmlformats.org/presentationml/2006/main">
   <p:cSld>
     <p:spTree>
@@ -8752,137 +9245,6 @@
     <p:extLst>
       <p:ext uri="{BB962C8B-B14F-4D97-AF65-F5344CB8AC3E}">
         <p14:creationId xmlns:p14="http://schemas.microsoft.com/office/powerpoint/2010/main" val="1985047262"/>
-      </p:ext>
-    </p:extLst>
-  </p:cSld>
-  <p:clrMapOvr>
-    <a:masterClrMapping/>
-  </p:clrMapOvr>
-  <mc:AlternateContent xmlns:mc="http://schemas.openxmlformats.org/markup-compatibility/2006" xmlns:p14="http://schemas.microsoft.com/office/powerpoint/2010/main">
-    <mc:Choice Requires="p14">
-      <p:transition spd="med" p14:dur="700">
-        <p:fade/>
-      </p:transition>
-    </mc:Choice>
-    <mc:Fallback xmlns="">
-      <p:transition spd="med">
-        <p:fade/>
-      </p:transition>
-    </mc:Fallback>
-  </mc:AlternateContent>
-</p:sld>
-</file>
-
-<file path=ppt/slides/slide9.xml><?xml version="1.0" encoding="utf-8"?>
-<p:sld xmlns:a="http://schemas.openxmlformats.org/drawingml/2006/main" xmlns:r="http://schemas.openxmlformats.org/officeDocument/2006/relationships" xmlns:p="http://schemas.openxmlformats.org/presentationml/2006/main">
-  <p:cSld>
-    <p:spTree>
-      <p:nvGrpSpPr>
-        <p:cNvPr id="1" name=""/>
-        <p:cNvGrpSpPr/>
-        <p:nvPr/>
-      </p:nvGrpSpPr>
-      <p:grpSpPr>
-        <a:xfrm>
-          <a:off x="0" y="0"/>
-          <a:ext cx="0" cy="0"/>
-          <a:chOff x="0" y="0"/>
-          <a:chExt cx="0" cy="0"/>
-        </a:xfrm>
-      </p:grpSpPr>
-      <p:sp>
-        <p:nvSpPr>
-          <p:cNvPr id="2" name="Title 1">
-            <a:extLst>
-              <a:ext uri="{FF2B5EF4-FFF2-40B4-BE49-F238E27FC236}">
-                <a16:creationId xmlns:a16="http://schemas.microsoft.com/office/drawing/2014/main" id="{4BD51FDF-D28F-A849-8CAA-3F50D8980894}"/>
-              </a:ext>
-            </a:extLst>
-          </p:cNvPr>
-          <p:cNvSpPr>
-            <a:spLocks noGrp="1"/>
-          </p:cNvSpPr>
-          <p:nvPr>
-            <p:ph type="title"/>
-          </p:nvPr>
-        </p:nvSpPr>
-        <p:spPr/>
-        <p:txBody>
-          <a:bodyPr/>
-          <a:lstStyle/>
-          <a:p>
-            <a:r>
-              <a:rPr lang="en-US" dirty="0"/>
-              <a:t>State over state vis</a:t>
-            </a:r>
-          </a:p>
-        </p:txBody>
-      </p:sp>
-      <p:sp>
-        <p:nvSpPr>
-          <p:cNvPr id="3" name="Text Placeholder 2">
-            <a:extLst>
-              <a:ext uri="{FF2B5EF4-FFF2-40B4-BE49-F238E27FC236}">
-                <a16:creationId xmlns:a16="http://schemas.microsoft.com/office/drawing/2014/main" id="{92350507-D243-1E42-8154-00B79400CF9E}"/>
-              </a:ext>
-            </a:extLst>
-          </p:cNvPr>
-          <p:cNvSpPr>
-            <a:spLocks noGrp="1"/>
-          </p:cNvSpPr>
-          <p:nvPr>
-            <p:ph type="body" idx="1"/>
-          </p:nvPr>
-        </p:nvSpPr>
-        <p:spPr/>
-        <p:txBody>
-          <a:bodyPr/>
-          <a:lstStyle/>
-          <a:p>
-            <a:endParaRPr lang="en-US"/>
-          </a:p>
-        </p:txBody>
-      </p:sp>
-      <p:pic>
-        <p:nvPicPr>
-          <p:cNvPr id="7" name="Picture 6" descr="Chart, bar chart&#10;&#10;Description automatically generated">
-            <a:extLst>
-              <a:ext uri="{FF2B5EF4-FFF2-40B4-BE49-F238E27FC236}">
-                <a16:creationId xmlns:a16="http://schemas.microsoft.com/office/drawing/2014/main" id="{B6362E7C-5926-4E43-BE2B-47AE92CCDA7D}"/>
-              </a:ext>
-            </a:extLst>
-          </p:cNvPr>
-          <p:cNvPicPr>
-            <a:picLocks noChangeAspect="1"/>
-          </p:cNvPicPr>
-          <p:nvPr/>
-        </p:nvPicPr>
-        <p:blipFill>
-          <a:blip r:embed="rId2">
-            <a:extLst>
-              <a:ext uri="{28A0092B-C50C-407E-A947-70E740481C1C}">
-                <a14:useLocalDpi xmlns:a14="http://schemas.microsoft.com/office/drawing/2010/main" val="0"/>
-              </a:ext>
-            </a:extLst>
-          </a:blip>
-          <a:stretch>
-            <a:fillRect/>
-          </a:stretch>
-        </p:blipFill>
-        <p:spPr>
-          <a:xfrm>
-            <a:off x="1066800" y="6927"/>
-            <a:ext cx="10316296" cy="6877531"/>
-          </a:xfrm>
-          <a:prstGeom prst="rect">
-            <a:avLst/>
-          </a:prstGeom>
-        </p:spPr>
-      </p:pic>
-    </p:spTree>
-    <p:extLst>
-      <p:ext uri="{BB962C8B-B14F-4D97-AF65-F5344CB8AC3E}">
-        <p14:creationId xmlns:p14="http://schemas.microsoft.com/office/powerpoint/2010/main" val="4020381891"/>
       </p:ext>
     </p:extLst>
   </p:cSld>

</xml_diff>